<commit_message>
changed the scale for april 1
</commit_message>
<xml_diff>
--- a/Tracking_Cases.pptx
+++ b/Tracking_Cases.pptx
@@ -111,6 +111,11 @@
       </a:defRPr>
     </a:lvl9pPr>
   </p:defaultTextStyle>
+  <p:extLst>
+    <p:ext uri="{EFAFB233-063F-42B5-8137-9DF3F51BA10A}">
+      <p15:sldGuideLst xmlns:p15="http://schemas.microsoft.com/office/powerpoint/2012/main"/>
+    </p:ext>
+  </p:extLst>
 </p:presentation>
 </file>
 
@@ -3536,10 +3541,10 @@
       </p:grpSpPr>
       <p:pic>
         <p:nvPicPr>
-          <p:cNvPr id="3" name="Picture 2">
-            <a:extLst>
-              <a:ext uri="{FF2B5EF4-FFF2-40B4-BE49-F238E27FC236}">
-                <a16:creationId xmlns:a16="http://schemas.microsoft.com/office/drawing/2014/main" id="{BE5CE82C-6E27-4434-9F10-A2FC96F00274}"/>
+          <p:cNvPr id="2" name="Picture 1">
+            <a:extLst>
+              <a:ext uri="{FF2B5EF4-FFF2-40B4-BE49-F238E27FC236}">
+                <a16:creationId xmlns:a16="http://schemas.microsoft.com/office/drawing/2014/main" id="{EE2917F3-7863-4B5A-82EF-F3F83B7D9515}"/>
               </a:ext>
             </a:extLst>
           </p:cNvPr>
@@ -3801,10 +3806,10 @@
       </p:grpSpPr>
       <p:pic>
         <p:nvPicPr>
-          <p:cNvPr id="2" name="Picture 1" descr="A close up of a map&#10;&#10;Description automatically generated">
-            <a:extLst>
-              <a:ext uri="{FF2B5EF4-FFF2-40B4-BE49-F238E27FC236}">
-                <a16:creationId xmlns:a16="http://schemas.microsoft.com/office/drawing/2014/main" id="{A69C61F2-2AEF-485C-9B12-1AADB37C81EC}"/>
+          <p:cNvPr id="3" name="Picture 2">
+            <a:extLst>
+              <a:ext uri="{FF2B5EF4-FFF2-40B4-BE49-F238E27FC236}">
+                <a16:creationId xmlns:a16="http://schemas.microsoft.com/office/drawing/2014/main" id="{A9B745A1-288A-4933-BB86-2AA49B394859}"/>
               </a:ext>
             </a:extLst>
           </p:cNvPr>

</xml_diff>

<commit_message>
new state_population dataset and just went through some interesting pains. have the percent infected plot looking ripe tho :)
</commit_message>
<xml_diff>
--- a/Tracking_Cases.pptx
+++ b/Tracking_Cases.pptx
@@ -266,7 +266,7 @@
           <a:p>
             <a:fld id="{FA67203A-B7A7-410A-8A0D-DC4D30057A5B}" type="datetimeFigureOut">
               <a:rPr lang="en-US" smtClean="0"/>
-              <a:t>4/2/2020</a:t>
+              <a:t>4/5/2020</a:t>
             </a:fld>
             <a:endParaRPr lang="en-US"/>
           </a:p>
@@ -464,7 +464,7 @@
           <a:p>
             <a:fld id="{FA67203A-B7A7-410A-8A0D-DC4D30057A5B}" type="datetimeFigureOut">
               <a:rPr lang="en-US" smtClean="0"/>
-              <a:t>4/2/2020</a:t>
+              <a:t>4/5/2020</a:t>
             </a:fld>
             <a:endParaRPr lang="en-US"/>
           </a:p>
@@ -672,7 +672,7 @@
           <a:p>
             <a:fld id="{FA67203A-B7A7-410A-8A0D-DC4D30057A5B}" type="datetimeFigureOut">
               <a:rPr lang="en-US" smtClean="0"/>
-              <a:t>4/2/2020</a:t>
+              <a:t>4/5/2020</a:t>
             </a:fld>
             <a:endParaRPr lang="en-US"/>
           </a:p>
@@ -870,7 +870,7 @@
           <a:p>
             <a:fld id="{FA67203A-B7A7-410A-8A0D-DC4D30057A5B}" type="datetimeFigureOut">
               <a:rPr lang="en-US" smtClean="0"/>
-              <a:t>4/2/2020</a:t>
+              <a:t>4/5/2020</a:t>
             </a:fld>
             <a:endParaRPr lang="en-US"/>
           </a:p>
@@ -1145,7 +1145,7 @@
           <a:p>
             <a:fld id="{FA67203A-B7A7-410A-8A0D-DC4D30057A5B}" type="datetimeFigureOut">
               <a:rPr lang="en-US" smtClean="0"/>
-              <a:t>4/2/2020</a:t>
+              <a:t>4/5/2020</a:t>
             </a:fld>
             <a:endParaRPr lang="en-US"/>
           </a:p>
@@ -1410,7 +1410,7 @@
           <a:p>
             <a:fld id="{FA67203A-B7A7-410A-8A0D-DC4D30057A5B}" type="datetimeFigureOut">
               <a:rPr lang="en-US" smtClean="0"/>
-              <a:t>4/2/2020</a:t>
+              <a:t>4/5/2020</a:t>
             </a:fld>
             <a:endParaRPr lang="en-US"/>
           </a:p>
@@ -1822,7 +1822,7 @@
           <a:p>
             <a:fld id="{FA67203A-B7A7-410A-8A0D-DC4D30057A5B}" type="datetimeFigureOut">
               <a:rPr lang="en-US" smtClean="0"/>
-              <a:t>4/2/2020</a:t>
+              <a:t>4/5/2020</a:t>
             </a:fld>
             <a:endParaRPr lang="en-US"/>
           </a:p>
@@ -1963,7 +1963,7 @@
           <a:p>
             <a:fld id="{FA67203A-B7A7-410A-8A0D-DC4D30057A5B}" type="datetimeFigureOut">
               <a:rPr lang="en-US" smtClean="0"/>
-              <a:t>4/2/2020</a:t>
+              <a:t>4/5/2020</a:t>
             </a:fld>
             <a:endParaRPr lang="en-US"/>
           </a:p>
@@ -2076,7 +2076,7 @@
           <a:p>
             <a:fld id="{FA67203A-B7A7-410A-8A0D-DC4D30057A5B}" type="datetimeFigureOut">
               <a:rPr lang="en-US" smtClean="0"/>
-              <a:t>4/2/2020</a:t>
+              <a:t>4/5/2020</a:t>
             </a:fld>
             <a:endParaRPr lang="en-US"/>
           </a:p>
@@ -2387,7 +2387,7 @@
           <a:p>
             <a:fld id="{FA67203A-B7A7-410A-8A0D-DC4D30057A5B}" type="datetimeFigureOut">
               <a:rPr lang="en-US" smtClean="0"/>
-              <a:t>4/2/2020</a:t>
+              <a:t>4/5/2020</a:t>
             </a:fld>
             <a:endParaRPr lang="en-US"/>
           </a:p>
@@ -2675,7 +2675,7 @@
           <a:p>
             <a:fld id="{FA67203A-B7A7-410A-8A0D-DC4D30057A5B}" type="datetimeFigureOut">
               <a:rPr lang="en-US" smtClean="0"/>
-              <a:t>4/2/2020</a:t>
+              <a:t>4/5/2020</a:t>
             </a:fld>
             <a:endParaRPr lang="en-US"/>
           </a:p>
@@ -2916,7 +2916,7 @@
           <a:p>
             <a:fld id="{FA67203A-B7A7-410A-8A0D-DC4D30057A5B}" type="datetimeFigureOut">
               <a:rPr lang="en-US" smtClean="0"/>
-              <a:t>4/2/2020</a:t>
+              <a:t>4/5/2020</a:t>
             </a:fld>
             <a:endParaRPr lang="en-US"/>
           </a:p>

</xml_diff>

<commit_message>
lauren always knows whats best
</commit_message>
<xml_diff>
--- a/Tracking_Cases.pptx
+++ b/Tracking_Cases.pptx
@@ -9,10 +9,11 @@
     <p:sldId id="261" r:id="rId3"/>
     <p:sldId id="259" r:id="rId4"/>
     <p:sldId id="258" r:id="rId5"/>
-    <p:sldId id="264" r:id="rId6"/>
-    <p:sldId id="262" r:id="rId7"/>
-    <p:sldId id="260" r:id="rId8"/>
-    <p:sldId id="257" r:id="rId9"/>
+    <p:sldId id="265" r:id="rId6"/>
+    <p:sldId id="264" r:id="rId7"/>
+    <p:sldId id="262" r:id="rId8"/>
+    <p:sldId id="260" r:id="rId9"/>
+    <p:sldId id="257" r:id="rId10"/>
   </p:sldIdLst>
   <p:sldSz cx="12192000" cy="6858000"/>
   <p:notesSz cx="6858000" cy="9144000"/>
@@ -266,7 +267,7 @@
           <a:p>
             <a:fld id="{FA67203A-B7A7-410A-8A0D-DC4D30057A5B}" type="datetimeFigureOut">
               <a:rPr lang="en-US" smtClean="0"/>
-              <a:t>4/5/2020</a:t>
+              <a:t>4/8/2020</a:t>
             </a:fld>
             <a:endParaRPr lang="en-US"/>
           </a:p>
@@ -464,7 +465,7 @@
           <a:p>
             <a:fld id="{FA67203A-B7A7-410A-8A0D-DC4D30057A5B}" type="datetimeFigureOut">
               <a:rPr lang="en-US" smtClean="0"/>
-              <a:t>4/5/2020</a:t>
+              <a:t>4/8/2020</a:t>
             </a:fld>
             <a:endParaRPr lang="en-US"/>
           </a:p>
@@ -672,7 +673,7 @@
           <a:p>
             <a:fld id="{FA67203A-B7A7-410A-8A0D-DC4D30057A5B}" type="datetimeFigureOut">
               <a:rPr lang="en-US" smtClean="0"/>
-              <a:t>4/5/2020</a:t>
+              <a:t>4/8/2020</a:t>
             </a:fld>
             <a:endParaRPr lang="en-US"/>
           </a:p>
@@ -870,7 +871,7 @@
           <a:p>
             <a:fld id="{FA67203A-B7A7-410A-8A0D-DC4D30057A5B}" type="datetimeFigureOut">
               <a:rPr lang="en-US" smtClean="0"/>
-              <a:t>4/5/2020</a:t>
+              <a:t>4/8/2020</a:t>
             </a:fld>
             <a:endParaRPr lang="en-US"/>
           </a:p>
@@ -1145,7 +1146,7 @@
           <a:p>
             <a:fld id="{FA67203A-B7A7-410A-8A0D-DC4D30057A5B}" type="datetimeFigureOut">
               <a:rPr lang="en-US" smtClean="0"/>
-              <a:t>4/5/2020</a:t>
+              <a:t>4/8/2020</a:t>
             </a:fld>
             <a:endParaRPr lang="en-US"/>
           </a:p>
@@ -1410,7 +1411,7 @@
           <a:p>
             <a:fld id="{FA67203A-B7A7-410A-8A0D-DC4D30057A5B}" type="datetimeFigureOut">
               <a:rPr lang="en-US" smtClean="0"/>
-              <a:t>4/5/2020</a:t>
+              <a:t>4/8/2020</a:t>
             </a:fld>
             <a:endParaRPr lang="en-US"/>
           </a:p>
@@ -1822,7 +1823,7 @@
           <a:p>
             <a:fld id="{FA67203A-B7A7-410A-8A0D-DC4D30057A5B}" type="datetimeFigureOut">
               <a:rPr lang="en-US" smtClean="0"/>
-              <a:t>4/5/2020</a:t>
+              <a:t>4/8/2020</a:t>
             </a:fld>
             <a:endParaRPr lang="en-US"/>
           </a:p>
@@ -1963,7 +1964,7 @@
           <a:p>
             <a:fld id="{FA67203A-B7A7-410A-8A0D-DC4D30057A5B}" type="datetimeFigureOut">
               <a:rPr lang="en-US" smtClean="0"/>
-              <a:t>4/5/2020</a:t>
+              <a:t>4/8/2020</a:t>
             </a:fld>
             <a:endParaRPr lang="en-US"/>
           </a:p>
@@ -2076,7 +2077,7 @@
           <a:p>
             <a:fld id="{FA67203A-B7A7-410A-8A0D-DC4D30057A5B}" type="datetimeFigureOut">
               <a:rPr lang="en-US" smtClean="0"/>
-              <a:t>4/5/2020</a:t>
+              <a:t>4/8/2020</a:t>
             </a:fld>
             <a:endParaRPr lang="en-US"/>
           </a:p>
@@ -2387,7 +2388,7 @@
           <a:p>
             <a:fld id="{FA67203A-B7A7-410A-8A0D-DC4D30057A5B}" type="datetimeFigureOut">
               <a:rPr lang="en-US" smtClean="0"/>
-              <a:t>4/5/2020</a:t>
+              <a:t>4/8/2020</a:t>
             </a:fld>
             <a:endParaRPr lang="en-US"/>
           </a:p>
@@ -2675,7 +2676,7 @@
           <a:p>
             <a:fld id="{FA67203A-B7A7-410A-8A0D-DC4D30057A5B}" type="datetimeFigureOut">
               <a:rPr lang="en-US" smtClean="0"/>
-              <a:t>4/5/2020</a:t>
+              <a:t>4/8/2020</a:t>
             </a:fld>
             <a:endParaRPr lang="en-US"/>
           </a:p>
@@ -2916,7 +2917,7 @@
           <a:p>
             <a:fld id="{FA67203A-B7A7-410A-8A0D-DC4D30057A5B}" type="datetimeFigureOut">
               <a:rPr lang="en-US" smtClean="0"/>
-              <a:t>4/5/2020</a:t>
+              <a:t>4/8/2020</a:t>
             </a:fld>
             <a:endParaRPr lang="en-US"/>
           </a:p>
@@ -3407,10 +3408,10 @@
       </p:grpSpPr>
       <p:pic>
         <p:nvPicPr>
-          <p:cNvPr id="3" name="Picture 2">
-            <a:extLst>
-              <a:ext uri="{FF2B5EF4-FFF2-40B4-BE49-F238E27FC236}">
-                <a16:creationId xmlns:a16="http://schemas.microsoft.com/office/drawing/2014/main" id="{643A5954-55AD-4847-B5C2-30C642D2EDBC}"/>
+          <p:cNvPr id="5" name="Picture 4">
+            <a:extLst>
+              <a:ext uri="{FF2B5EF4-FFF2-40B4-BE49-F238E27FC236}">
+                <a16:creationId xmlns:a16="http://schemas.microsoft.com/office/drawing/2014/main" id="{7DE3AB02-3B17-4335-8B17-1C3268BCCD56}"/>
               </a:ext>
             </a:extLst>
           </p:cNvPr>
@@ -3421,7 +3422,7 @@
         </p:nvPicPr>
         <p:blipFill rotWithShape="1">
           <a:blip r:embed="rId2"/>
-          <a:srcRect b="1747"/>
+          <a:srcRect b="3434"/>
           <a:stretch/>
         </p:blipFill>
         <p:spPr>
@@ -3474,10 +3475,10 @@
       </p:grpSpPr>
       <p:pic>
         <p:nvPicPr>
-          <p:cNvPr id="3" name="Picture 2">
-            <a:extLst>
-              <a:ext uri="{FF2B5EF4-FFF2-40B4-BE49-F238E27FC236}">
-                <a16:creationId xmlns:a16="http://schemas.microsoft.com/office/drawing/2014/main" id="{86766E01-D9C3-4F7E-96B7-1393A184EE7E}"/>
+          <p:cNvPr id="5" name="Picture 4">
+            <a:extLst>
+              <a:ext uri="{FF2B5EF4-FFF2-40B4-BE49-F238E27FC236}">
+                <a16:creationId xmlns:a16="http://schemas.microsoft.com/office/drawing/2014/main" id="{C32C81C8-8227-4060-A4F7-CE35C864B6B9}"/>
               </a:ext>
             </a:extLst>
           </p:cNvPr>
@@ -3488,7 +3489,7 @@
         </p:nvPicPr>
         <p:blipFill rotWithShape="1">
           <a:blip r:embed="rId2"/>
-          <a:srcRect b="1747"/>
+          <a:srcRect b="3434"/>
           <a:stretch/>
         </p:blipFill>
         <p:spPr>
@@ -3541,10 +3542,10 @@
       </p:grpSpPr>
       <p:pic>
         <p:nvPicPr>
-          <p:cNvPr id="2" name="Picture 1">
-            <a:extLst>
-              <a:ext uri="{FF2B5EF4-FFF2-40B4-BE49-F238E27FC236}">
-                <a16:creationId xmlns:a16="http://schemas.microsoft.com/office/drawing/2014/main" id="{EE2917F3-7863-4B5A-82EF-F3F83B7D9515}"/>
+          <p:cNvPr id="4" name="Picture 3">
+            <a:extLst>
+              <a:ext uri="{FF2B5EF4-FFF2-40B4-BE49-F238E27FC236}">
+                <a16:creationId xmlns:a16="http://schemas.microsoft.com/office/drawing/2014/main" id="{EE9756AE-F8A4-4552-B47E-788961D483BF}"/>
               </a:ext>
             </a:extLst>
           </p:cNvPr>
@@ -3555,7 +3556,7 @@
         </p:nvPicPr>
         <p:blipFill rotWithShape="1">
           <a:blip r:embed="rId2"/>
-          <a:srcRect b="1747"/>
+          <a:srcRect b="3434"/>
           <a:stretch/>
         </p:blipFill>
         <p:spPr>
@@ -3584,70 +3585,6 @@
 <file path=ppt/slides/slide5.xml><?xml version="1.0" encoding="utf-8"?>
 <p:sld xmlns:a="http://schemas.openxmlformats.org/drawingml/2006/main" xmlns:r="http://schemas.openxmlformats.org/officeDocument/2006/relationships" xmlns:p="http://schemas.openxmlformats.org/presentationml/2006/main">
   <p:cSld>
-    <p:spTree>
-      <p:nvGrpSpPr>
-        <p:cNvPr id="1" name=""/>
-        <p:cNvGrpSpPr/>
-        <p:nvPr/>
-      </p:nvGrpSpPr>
-      <p:grpSpPr>
-        <a:xfrm>
-          <a:off x="0" y="0"/>
-          <a:ext cx="0" cy="0"/>
-          <a:chOff x="0" y="0"/>
-          <a:chExt cx="0" cy="0"/>
-        </a:xfrm>
-      </p:grpSpPr>
-      <p:sp>
-        <p:nvSpPr>
-          <p:cNvPr id="2" name="Title 1">
-            <a:extLst>
-              <a:ext uri="{FF2B5EF4-FFF2-40B4-BE49-F238E27FC236}">
-                <a16:creationId xmlns:a16="http://schemas.microsoft.com/office/drawing/2014/main" id="{3B79B498-7C8F-4E3E-9C2F-AB054199B537}"/>
-              </a:ext>
-            </a:extLst>
-          </p:cNvPr>
-          <p:cNvSpPr>
-            <a:spLocks noGrp="1"/>
-          </p:cNvSpPr>
-          <p:nvPr>
-            <p:ph type="title"/>
-          </p:nvPr>
-        </p:nvSpPr>
-        <p:spPr>
-          <a:xfrm>
-            <a:off x="838200" y="2766218"/>
-            <a:ext cx="10515600" cy="1325563"/>
-          </a:xfrm>
-        </p:spPr>
-        <p:txBody>
-          <a:bodyPr/>
-          <a:lstStyle/>
-          <a:p>
-            <a:pPr algn="ctr"/>
-            <a:r>
-              <a:rPr lang="en-US" dirty="0"/>
-              <a:t>Percent of State Population Infected with COVID-19</a:t>
-            </a:r>
-          </a:p>
-        </p:txBody>
-      </p:sp>
-    </p:spTree>
-    <p:extLst>
-      <p:ext uri="{BB962C8B-B14F-4D97-AF65-F5344CB8AC3E}">
-        <p14:creationId xmlns:p14="http://schemas.microsoft.com/office/powerpoint/2010/main" val="411004835"/>
-      </p:ext>
-    </p:extLst>
-  </p:cSld>
-  <p:clrMapOvr>
-    <a:masterClrMapping/>
-  </p:clrMapOvr>
-</p:sld>
-</file>
-
-<file path=ppt/slides/slide6.xml><?xml version="1.0" encoding="utf-8"?>
-<p:sld xmlns:a="http://schemas.openxmlformats.org/drawingml/2006/main" xmlns:r="http://schemas.openxmlformats.org/officeDocument/2006/relationships" xmlns:p="http://schemas.openxmlformats.org/presentationml/2006/main">
-  <p:cSld>
     <p:bg>
       <p:bgPr>
         <a:solidFill>
@@ -3672,10 +3609,10 @@
       </p:grpSpPr>
       <p:pic>
         <p:nvPicPr>
-          <p:cNvPr id="2" name="Picture 1">
-            <a:extLst>
-              <a:ext uri="{FF2B5EF4-FFF2-40B4-BE49-F238E27FC236}">
-                <a16:creationId xmlns:a16="http://schemas.microsoft.com/office/drawing/2014/main" id="{03854C0B-1D2E-41F3-BA1E-B7248AB912F0}"/>
+          <p:cNvPr id="7" name="Picture 6" descr="A close up of a map&#10;&#10;Description automatically generated">
+            <a:extLst>
+              <a:ext uri="{FF2B5EF4-FFF2-40B4-BE49-F238E27FC236}">
+                <a16:creationId xmlns:a16="http://schemas.microsoft.com/office/drawing/2014/main" id="{8F247D5A-2C4B-41F8-8C35-E0A996819442}"/>
               </a:ext>
             </a:extLst>
           </p:cNvPr>
@@ -3686,7 +3623,7 @@
         </p:nvPicPr>
         <p:blipFill rotWithShape="1">
           <a:blip r:embed="rId2"/>
-          <a:srcRect b="1747"/>
+          <a:srcRect b="3434"/>
           <a:stretch/>
         </p:blipFill>
         <p:spPr>
@@ -3702,7 +3639,71 @@
     </p:spTree>
     <p:extLst>
       <p:ext uri="{BB962C8B-B14F-4D97-AF65-F5344CB8AC3E}">
-        <p14:creationId xmlns:p14="http://schemas.microsoft.com/office/powerpoint/2010/main" val="1565011391"/>
+        <p14:creationId xmlns:p14="http://schemas.microsoft.com/office/powerpoint/2010/main" val="648525742"/>
+      </p:ext>
+    </p:extLst>
+  </p:cSld>
+  <p:clrMapOvr>
+    <a:masterClrMapping/>
+  </p:clrMapOvr>
+</p:sld>
+</file>
+
+<file path=ppt/slides/slide6.xml><?xml version="1.0" encoding="utf-8"?>
+<p:sld xmlns:a="http://schemas.openxmlformats.org/drawingml/2006/main" xmlns:r="http://schemas.openxmlformats.org/officeDocument/2006/relationships" xmlns:p="http://schemas.openxmlformats.org/presentationml/2006/main">
+  <p:cSld>
+    <p:spTree>
+      <p:nvGrpSpPr>
+        <p:cNvPr id="1" name=""/>
+        <p:cNvGrpSpPr/>
+        <p:nvPr/>
+      </p:nvGrpSpPr>
+      <p:grpSpPr>
+        <a:xfrm>
+          <a:off x="0" y="0"/>
+          <a:ext cx="0" cy="0"/>
+          <a:chOff x="0" y="0"/>
+          <a:chExt cx="0" cy="0"/>
+        </a:xfrm>
+      </p:grpSpPr>
+      <p:sp>
+        <p:nvSpPr>
+          <p:cNvPr id="2" name="Title 1">
+            <a:extLst>
+              <a:ext uri="{FF2B5EF4-FFF2-40B4-BE49-F238E27FC236}">
+                <a16:creationId xmlns:a16="http://schemas.microsoft.com/office/drawing/2014/main" id="{3B79B498-7C8F-4E3E-9C2F-AB054199B537}"/>
+              </a:ext>
+            </a:extLst>
+          </p:cNvPr>
+          <p:cNvSpPr>
+            <a:spLocks noGrp="1"/>
+          </p:cNvSpPr>
+          <p:nvPr>
+            <p:ph type="title"/>
+          </p:nvPr>
+        </p:nvSpPr>
+        <p:spPr>
+          <a:xfrm>
+            <a:off x="838200" y="2766218"/>
+            <a:ext cx="10515600" cy="1325563"/>
+          </a:xfrm>
+        </p:spPr>
+        <p:txBody>
+          <a:bodyPr/>
+          <a:lstStyle/>
+          <a:p>
+            <a:pPr algn="ctr"/>
+            <a:r>
+              <a:rPr lang="en-US" dirty="0"/>
+              <a:t>Percent of State Population Infected with COVID-19</a:t>
+            </a:r>
+          </a:p>
+        </p:txBody>
+      </p:sp>
+    </p:spTree>
+    <p:extLst>
+      <p:ext uri="{BB962C8B-B14F-4D97-AF65-F5344CB8AC3E}">
+        <p14:creationId xmlns:p14="http://schemas.microsoft.com/office/powerpoint/2010/main" val="411004835"/>
       </p:ext>
     </p:extLst>
   </p:cSld>
@@ -3739,6 +3740,73 @@
       </p:grpSpPr>
       <p:pic>
         <p:nvPicPr>
+          <p:cNvPr id="2" name="Picture 1">
+            <a:extLst>
+              <a:ext uri="{FF2B5EF4-FFF2-40B4-BE49-F238E27FC236}">
+                <a16:creationId xmlns:a16="http://schemas.microsoft.com/office/drawing/2014/main" id="{03854C0B-1D2E-41F3-BA1E-B7248AB912F0}"/>
+              </a:ext>
+            </a:extLst>
+          </p:cNvPr>
+          <p:cNvPicPr>
+            <a:picLocks noChangeAspect="1"/>
+          </p:cNvPicPr>
+          <p:nvPr/>
+        </p:nvPicPr>
+        <p:blipFill rotWithShape="1">
+          <a:blip r:embed="rId2"/>
+          <a:srcRect b="1747"/>
+          <a:stretch/>
+        </p:blipFill>
+        <p:spPr>
+          <a:xfrm>
+            <a:off x="20" y="10"/>
+            <a:ext cx="12191980" cy="6857990"/>
+          </a:xfrm>
+          <a:prstGeom prst="rect">
+            <a:avLst/>
+          </a:prstGeom>
+        </p:spPr>
+      </p:pic>
+    </p:spTree>
+    <p:extLst>
+      <p:ext uri="{BB962C8B-B14F-4D97-AF65-F5344CB8AC3E}">
+        <p14:creationId xmlns:p14="http://schemas.microsoft.com/office/powerpoint/2010/main" val="1565011391"/>
+      </p:ext>
+    </p:extLst>
+  </p:cSld>
+  <p:clrMapOvr>
+    <a:masterClrMapping/>
+  </p:clrMapOvr>
+</p:sld>
+</file>
+
+<file path=ppt/slides/slide8.xml><?xml version="1.0" encoding="utf-8"?>
+<p:sld xmlns:a="http://schemas.openxmlformats.org/drawingml/2006/main" xmlns:r="http://schemas.openxmlformats.org/officeDocument/2006/relationships" xmlns:p="http://schemas.openxmlformats.org/presentationml/2006/main">
+  <p:cSld>
+    <p:bg>
+      <p:bgPr>
+        <a:solidFill>
+          <a:schemeClr val="bg1"/>
+        </a:solidFill>
+        <a:effectLst/>
+      </p:bgPr>
+    </p:bg>
+    <p:spTree>
+      <p:nvGrpSpPr>
+        <p:cNvPr id="1" name=""/>
+        <p:cNvGrpSpPr/>
+        <p:nvPr/>
+      </p:nvGrpSpPr>
+      <p:grpSpPr>
+        <a:xfrm>
+          <a:off x="0" y="0"/>
+          <a:ext cx="0" cy="0"/>
+          <a:chOff x="0" y="0"/>
+          <a:chExt cx="0" cy="0"/>
+        </a:xfrm>
+      </p:grpSpPr>
+      <p:pic>
+        <p:nvPicPr>
           <p:cNvPr id="2" name="Picture 1" descr="A picture containing text, map&#10;&#10;Description automatically generated">
             <a:extLst>
               <a:ext uri="{FF2B5EF4-FFF2-40B4-BE49-F238E27FC236}">
@@ -3779,7 +3847,7 @@
 </p:sld>
 </file>
 
-<file path=ppt/slides/slide8.xml><?xml version="1.0" encoding="utf-8"?>
+<file path=ppt/slides/slide9.xml><?xml version="1.0" encoding="utf-8"?>
 <p:sld xmlns:a="http://schemas.openxmlformats.org/drawingml/2006/main" xmlns:r="http://schemas.openxmlformats.org/officeDocument/2006/relationships" xmlns:p="http://schemas.openxmlformats.org/presentationml/2006/main">
   <p:cSld>
     <p:bg>

</xml_diff>

<commit_message>
been a minute but we back in this
</commit_message>
<xml_diff>
--- a/Tracking_Cases.pptx
+++ b/Tracking_Cases.pptx
@@ -10,10 +10,13 @@
     <p:sldId id="259" r:id="rId4"/>
     <p:sldId id="258" r:id="rId5"/>
     <p:sldId id="265" r:id="rId6"/>
-    <p:sldId id="264" r:id="rId7"/>
-    <p:sldId id="262" r:id="rId8"/>
-    <p:sldId id="260" r:id="rId9"/>
-    <p:sldId id="257" r:id="rId10"/>
+    <p:sldId id="266" r:id="rId7"/>
+    <p:sldId id="267" r:id="rId8"/>
+    <p:sldId id="268" r:id="rId9"/>
+    <p:sldId id="264" r:id="rId10"/>
+    <p:sldId id="262" r:id="rId11"/>
+    <p:sldId id="260" r:id="rId12"/>
+    <p:sldId id="257" r:id="rId13"/>
   </p:sldIdLst>
   <p:sldSz cx="12192000" cy="6858000"/>
   <p:notesSz cx="6858000" cy="9144000"/>
@@ -267,7 +270,7 @@
           <a:p>
             <a:fld id="{FA67203A-B7A7-410A-8A0D-DC4D30057A5B}" type="datetimeFigureOut">
               <a:rPr lang="en-US" smtClean="0"/>
-              <a:t>4/8/2020</a:t>
+              <a:t>4/24/2020</a:t>
             </a:fld>
             <a:endParaRPr lang="en-US"/>
           </a:p>
@@ -465,7 +468,7 @@
           <a:p>
             <a:fld id="{FA67203A-B7A7-410A-8A0D-DC4D30057A5B}" type="datetimeFigureOut">
               <a:rPr lang="en-US" smtClean="0"/>
-              <a:t>4/8/2020</a:t>
+              <a:t>4/24/2020</a:t>
             </a:fld>
             <a:endParaRPr lang="en-US"/>
           </a:p>
@@ -673,7 +676,7 @@
           <a:p>
             <a:fld id="{FA67203A-B7A7-410A-8A0D-DC4D30057A5B}" type="datetimeFigureOut">
               <a:rPr lang="en-US" smtClean="0"/>
-              <a:t>4/8/2020</a:t>
+              <a:t>4/24/2020</a:t>
             </a:fld>
             <a:endParaRPr lang="en-US"/>
           </a:p>
@@ -871,7 +874,7 @@
           <a:p>
             <a:fld id="{FA67203A-B7A7-410A-8A0D-DC4D30057A5B}" type="datetimeFigureOut">
               <a:rPr lang="en-US" smtClean="0"/>
-              <a:t>4/8/2020</a:t>
+              <a:t>4/24/2020</a:t>
             </a:fld>
             <a:endParaRPr lang="en-US"/>
           </a:p>
@@ -1146,7 +1149,7 @@
           <a:p>
             <a:fld id="{FA67203A-B7A7-410A-8A0D-DC4D30057A5B}" type="datetimeFigureOut">
               <a:rPr lang="en-US" smtClean="0"/>
-              <a:t>4/8/2020</a:t>
+              <a:t>4/24/2020</a:t>
             </a:fld>
             <a:endParaRPr lang="en-US"/>
           </a:p>
@@ -1411,7 +1414,7 @@
           <a:p>
             <a:fld id="{FA67203A-B7A7-410A-8A0D-DC4D30057A5B}" type="datetimeFigureOut">
               <a:rPr lang="en-US" smtClean="0"/>
-              <a:t>4/8/2020</a:t>
+              <a:t>4/24/2020</a:t>
             </a:fld>
             <a:endParaRPr lang="en-US"/>
           </a:p>
@@ -1823,7 +1826,7 @@
           <a:p>
             <a:fld id="{FA67203A-B7A7-410A-8A0D-DC4D30057A5B}" type="datetimeFigureOut">
               <a:rPr lang="en-US" smtClean="0"/>
-              <a:t>4/8/2020</a:t>
+              <a:t>4/24/2020</a:t>
             </a:fld>
             <a:endParaRPr lang="en-US"/>
           </a:p>
@@ -1964,7 +1967,7 @@
           <a:p>
             <a:fld id="{FA67203A-B7A7-410A-8A0D-DC4D30057A5B}" type="datetimeFigureOut">
               <a:rPr lang="en-US" smtClean="0"/>
-              <a:t>4/8/2020</a:t>
+              <a:t>4/24/2020</a:t>
             </a:fld>
             <a:endParaRPr lang="en-US"/>
           </a:p>
@@ -2077,7 +2080,7 @@
           <a:p>
             <a:fld id="{FA67203A-B7A7-410A-8A0D-DC4D30057A5B}" type="datetimeFigureOut">
               <a:rPr lang="en-US" smtClean="0"/>
-              <a:t>4/8/2020</a:t>
+              <a:t>4/24/2020</a:t>
             </a:fld>
             <a:endParaRPr lang="en-US"/>
           </a:p>
@@ -2388,7 +2391,7 @@
           <a:p>
             <a:fld id="{FA67203A-B7A7-410A-8A0D-DC4D30057A5B}" type="datetimeFigureOut">
               <a:rPr lang="en-US" smtClean="0"/>
-              <a:t>4/8/2020</a:t>
+              <a:t>4/24/2020</a:t>
             </a:fld>
             <a:endParaRPr lang="en-US"/>
           </a:p>
@@ -2676,7 +2679,7 @@
           <a:p>
             <a:fld id="{FA67203A-B7A7-410A-8A0D-DC4D30057A5B}" type="datetimeFigureOut">
               <a:rPr lang="en-US" smtClean="0"/>
-              <a:t>4/8/2020</a:t>
+              <a:t>4/24/2020</a:t>
             </a:fld>
             <a:endParaRPr lang="en-US"/>
           </a:p>
@@ -2917,7 +2920,7 @@
           <a:p>
             <a:fld id="{FA67203A-B7A7-410A-8A0D-DC4D30057A5B}" type="datetimeFigureOut">
               <a:rPr lang="en-US" smtClean="0"/>
-              <a:t>4/8/2020</a:t>
+              <a:t>4/24/2020</a:t>
             </a:fld>
             <a:endParaRPr lang="en-US"/>
           </a:p>
@@ -3320,6 +3323,14 @@
 <file path=ppt/slides/slide1.xml><?xml version="1.0" encoding="utf-8"?>
 <p:sld xmlns:a="http://schemas.openxmlformats.org/drawingml/2006/main" xmlns:r="http://schemas.openxmlformats.org/officeDocument/2006/relationships" xmlns:p="http://schemas.openxmlformats.org/presentationml/2006/main">
   <p:cSld>
+    <p:bg>
+      <p:bgPr>
+        <a:solidFill>
+          <a:schemeClr val="bg1"/>
+        </a:solidFill>
+        <a:effectLst/>
+      </p:bgPr>
+    </p:bg>
     <p:spTree>
       <p:nvGrpSpPr>
         <p:cNvPr id="1" name=""/>
@@ -3336,42 +3347,518 @@
       </p:grpSpPr>
       <p:sp>
         <p:nvSpPr>
-          <p:cNvPr id="2" name="Title 1">
-            <a:extLst>
-              <a:ext uri="{FF2B5EF4-FFF2-40B4-BE49-F238E27FC236}">
-                <a16:creationId xmlns:a16="http://schemas.microsoft.com/office/drawing/2014/main" id="{C3F4BF60-5AC8-49C0-A909-7E35DD371674}"/>
-              </a:ext>
-            </a:extLst>
-          </p:cNvPr>
-          <p:cNvSpPr>
-            <a:spLocks noGrp="1"/>
-          </p:cNvSpPr>
-          <p:nvPr>
-            <p:ph type="title"/>
+          <p:cNvPr id="20" name="Rectangle 19">
+            <a:extLst>
+              <a:ext uri="{FF2B5EF4-FFF2-40B4-BE49-F238E27FC236}">
+                <a16:creationId xmlns:a16="http://schemas.microsoft.com/office/drawing/2014/main" id="{27BDFED6-6E33-4606-AFE2-886ADB1C018E}"/>
+              </a:ext>
+              <a:ext uri="{C183D7F6-B498-43B3-948B-1728B52AA6E4}">
+                <adec:decorative xmlns:adec="http://schemas.microsoft.com/office/drawing/2017/decorative" val="1"/>
+              </a:ext>
+            </a:extLst>
+          </p:cNvPr>
+          <p:cNvSpPr>
+            <a:spLocks noGrp="1" noRot="1" noChangeAspect="1" noMove="1" noResize="1" noEditPoints="1" noAdjustHandles="1" noChangeArrowheads="1" noChangeShapeType="1" noTextEdit="1"/>
+          </p:cNvSpPr>
+          <p:nvPr>
+            <p:extLst>
+              <p:ext uri="{386F3935-93C4-4BCD-93E2-E3B085C9AB24}">
+                <p16:designElem xmlns:p16="http://schemas.microsoft.com/office/powerpoint/2015/main" val="1"/>
+              </p:ext>
+            </p:extLst>
           </p:nvPr>
         </p:nvSpPr>
         <p:spPr>
           <a:xfrm>
-            <a:off x="838200" y="2766218"/>
-            <a:ext cx="10515600" cy="1325563"/>
+            <a:off x="0" y="0"/>
+            <a:ext cx="12192000" cy="6858000"/>
+          </a:xfrm>
+          <a:prstGeom prst="rect">
+            <a:avLst/>
+          </a:prstGeom>
+          <a:solidFill>
+            <a:schemeClr val="tx1">
+              <a:lumMod val="95000"/>
+              <a:lumOff val="5000"/>
+            </a:schemeClr>
+          </a:solidFill>
+          <a:ln>
+            <a:noFill/>
+          </a:ln>
+        </p:spPr>
+        <p:style>
+          <a:lnRef idx="2">
+            <a:schemeClr val="accent1">
+              <a:shade val="50000"/>
+            </a:schemeClr>
+          </a:lnRef>
+          <a:fillRef idx="1">
+            <a:schemeClr val="accent1"/>
+          </a:fillRef>
+          <a:effectRef idx="0">
+            <a:schemeClr val="accent1"/>
+          </a:effectRef>
+          <a:fontRef idx="minor">
+            <a:schemeClr val="lt1"/>
+          </a:fontRef>
+        </p:style>
+        <p:txBody>
+          <a:bodyPr rtlCol="0" anchor="ctr"/>
+          <a:lstStyle/>
+          <a:p>
+            <a:pPr algn="ctr"/>
+            <a:endParaRPr lang="en-US" dirty="0"/>
+          </a:p>
+        </p:txBody>
+      </p:sp>
+      <p:pic>
+        <p:nvPicPr>
+          <p:cNvPr id="4" name="Picture 3" descr="A picture containing cake, decorated, sitting, close&#10;&#10;Description automatically generated">
+            <a:extLst>
+              <a:ext uri="{FF2B5EF4-FFF2-40B4-BE49-F238E27FC236}">
+                <a16:creationId xmlns:a16="http://schemas.microsoft.com/office/drawing/2014/main" id="{2E0BD6F2-A822-4D7A-BB54-450D4A5208A3}"/>
+              </a:ext>
+            </a:extLst>
+          </p:cNvPr>
+          <p:cNvPicPr>
+            <a:picLocks noChangeAspect="1"/>
+          </p:cNvPicPr>
+          <p:nvPr/>
+        </p:nvPicPr>
+        <p:blipFill rotWithShape="1">
+          <a:blip r:embed="rId2">
+            <a:alphaModFix/>
+            <a:extLst>
+              <a:ext uri="{28A0092B-C50C-407E-A947-70E740481C1C}">
+                <a14:useLocalDpi xmlns:a14="http://schemas.microsoft.com/office/drawing/2010/main" val="0"/>
+              </a:ext>
+            </a:extLst>
+          </a:blip>
+          <a:srcRect t="6791" r="-1" b="7590"/>
+          <a:stretch/>
+        </p:blipFill>
+        <p:spPr>
+          <a:xfrm>
+            <a:off x="4547937" y="-5"/>
+            <a:ext cx="7644062" cy="3681406"/>
+          </a:xfrm>
+          <a:prstGeom prst="rect">
+            <a:avLst/>
+          </a:prstGeom>
+        </p:spPr>
+      </p:pic>
+      <p:pic>
+        <p:nvPicPr>
+          <p:cNvPr id="6" name="Picture 5" descr="A picture containing person, indoor, standing, luggage&#10;&#10;Description automatically generated">
+            <a:extLst>
+              <a:ext uri="{FF2B5EF4-FFF2-40B4-BE49-F238E27FC236}">
+                <a16:creationId xmlns:a16="http://schemas.microsoft.com/office/drawing/2014/main" id="{478DD6E1-34D0-4314-9EBC-E75562DC1D2F}"/>
+              </a:ext>
+            </a:extLst>
+          </p:cNvPr>
+          <p:cNvPicPr>
+            <a:picLocks noChangeAspect="1"/>
+          </p:cNvPicPr>
+          <p:nvPr/>
+        </p:nvPicPr>
+        <p:blipFill rotWithShape="1">
+          <a:blip r:embed="rId3">
+            <a:extLst>
+              <a:ext uri="{28A0092B-C50C-407E-A947-70E740481C1C}">
+                <a14:useLocalDpi xmlns:a14="http://schemas.microsoft.com/office/drawing/2010/main" val="0"/>
+              </a:ext>
+            </a:extLst>
+          </a:blip>
+          <a:srcRect t="13261" r="-1" b="24482"/>
+          <a:stretch/>
+        </p:blipFill>
+        <p:spPr>
+          <a:xfrm>
+            <a:off x="4547938" y="3681409"/>
+            <a:ext cx="7644062" cy="3176595"/>
+          </a:xfrm>
+          <a:prstGeom prst="rect">
+            <a:avLst/>
+          </a:prstGeom>
+        </p:spPr>
+      </p:pic>
+      <p:sp>
+        <p:nvSpPr>
+          <p:cNvPr id="22" name="Rectangle 21">
+            <a:extLst>
+              <a:ext uri="{FF2B5EF4-FFF2-40B4-BE49-F238E27FC236}">
+                <a16:creationId xmlns:a16="http://schemas.microsoft.com/office/drawing/2014/main" id="{890DEF05-784E-4B61-89E4-04C4ECF4E5A0}"/>
+              </a:ext>
+              <a:ext uri="{C183D7F6-B498-43B3-948B-1728B52AA6E4}">
+                <adec:decorative xmlns:adec="http://schemas.microsoft.com/office/drawing/2017/decorative" val="1"/>
+              </a:ext>
+            </a:extLst>
+          </p:cNvPr>
+          <p:cNvSpPr>
+            <a:spLocks noGrp="1" noRot="1" noChangeAspect="1" noMove="1" noResize="1" noEditPoints="1" noAdjustHandles="1" noChangeArrowheads="1" noChangeShapeType="1" noTextEdit="1"/>
+          </p:cNvSpPr>
+          <p:nvPr>
+            <p:extLst>
+              <p:ext uri="{386F3935-93C4-4BCD-93E2-E3B085C9AB24}">
+                <p16:designElem xmlns:p16="http://schemas.microsoft.com/office/powerpoint/2015/main" val="1"/>
+              </p:ext>
+            </p:extLst>
+          </p:nvPr>
+        </p:nvSpPr>
+        <p:spPr>
+          <a:xfrm>
+            <a:off x="0" y="0"/>
+            <a:ext cx="12192000" cy="6858000"/>
+          </a:xfrm>
+          <a:prstGeom prst="rect">
+            <a:avLst/>
+          </a:prstGeom>
+          <a:gradFill>
+            <a:gsLst>
+              <a:gs pos="36000">
+                <a:schemeClr val="tx1">
+                  <a:lumMod val="95000"/>
+                  <a:lumOff val="5000"/>
+                </a:schemeClr>
+              </a:gs>
+              <a:gs pos="81000">
+                <a:schemeClr val="tx1">
+                  <a:lumMod val="95000"/>
+                  <a:lumOff val="5000"/>
+                  <a:alpha val="0"/>
+                </a:schemeClr>
+              </a:gs>
+            </a:gsLst>
+            <a:lin ang="0" scaled="0"/>
+          </a:gradFill>
+          <a:ln>
+            <a:noFill/>
+          </a:ln>
+        </p:spPr>
+        <p:style>
+          <a:lnRef idx="2">
+            <a:schemeClr val="accent1">
+              <a:shade val="50000"/>
+            </a:schemeClr>
+          </a:lnRef>
+          <a:fillRef idx="1">
+            <a:schemeClr val="accent1"/>
+          </a:fillRef>
+          <a:effectRef idx="0">
+            <a:schemeClr val="accent1"/>
+          </a:effectRef>
+          <a:fontRef idx="minor">
+            <a:schemeClr val="lt1"/>
+          </a:fontRef>
+        </p:style>
+        <p:txBody>
+          <a:bodyPr rtlCol="0" anchor="ctr"/>
+          <a:lstStyle/>
+          <a:p>
+            <a:pPr algn="ctr"/>
+            <a:endParaRPr lang="en-US"/>
+          </a:p>
+        </p:txBody>
+      </p:sp>
+      <p:sp>
+        <p:nvSpPr>
+          <p:cNvPr id="2" name="Title 1">
+            <a:extLst>
+              <a:ext uri="{FF2B5EF4-FFF2-40B4-BE49-F238E27FC236}">
+                <a16:creationId xmlns:a16="http://schemas.microsoft.com/office/drawing/2014/main" id="{C3F4BF60-5AC8-49C0-A909-7E35DD371674}"/>
+              </a:ext>
+            </a:extLst>
+          </p:cNvPr>
+          <p:cNvSpPr>
+            <a:spLocks noGrp="1"/>
+          </p:cNvSpPr>
+          <p:nvPr>
+            <p:ph type="title"/>
+          </p:nvPr>
+        </p:nvSpPr>
+        <p:spPr>
+          <a:xfrm>
+            <a:off x="838200" y="1115219"/>
+            <a:ext cx="5395912" cy="2387600"/>
           </a:xfrm>
         </p:spPr>
         <p:txBody>
-          <a:bodyPr/>
-          <a:lstStyle/>
-          <a:p>
-            <a:pPr algn="ctr"/>
-            <a:r>
-              <a:rPr lang="en-US" dirty="0"/>
+          <a:bodyPr vert="horz" lIns="91440" tIns="45720" rIns="91440" bIns="45720" rtlCol="0" anchor="b">
+            <a:normAutofit/>
+          </a:bodyPr>
+          <a:lstStyle/>
+          <a:p>
+            <a:r>
+              <a:rPr lang="en-US" sz="5000" kern="1200">
+                <a:solidFill>
+                  <a:schemeClr val="bg1"/>
+                </a:solidFill>
+                <a:latin typeface="+mj-lt"/>
+                <a:ea typeface="+mj-ea"/>
+                <a:cs typeface="+mj-cs"/>
+              </a:rPr>
               <a:t>COVID-19 Cases Per State:</a:t>
             </a:r>
           </a:p>
         </p:txBody>
       </p:sp>
+      <p:cxnSp>
+        <p:nvCxnSpPr>
+          <p:cNvPr id="24" name="Straight Connector 23">
+            <a:extLst>
+              <a:ext uri="{FF2B5EF4-FFF2-40B4-BE49-F238E27FC236}">
+                <a16:creationId xmlns:a16="http://schemas.microsoft.com/office/drawing/2014/main" id="{C41BAEC7-F7B0-4224-8B18-8F74B7D87F0B}"/>
+              </a:ext>
+              <a:ext uri="{C183D7F6-B498-43B3-948B-1728B52AA6E4}">
+                <adec:decorative xmlns:adec="http://schemas.microsoft.com/office/drawing/2017/decorative" val="1"/>
+              </a:ext>
+            </a:extLst>
+          </p:cNvPr>
+          <p:cNvCxnSpPr>
+            <a:cxnSpLocks noGrp="1" noRot="1" noChangeAspect="1" noMove="1" noResize="1" noEditPoints="1" noAdjustHandles="1" noChangeArrowheads="1" noChangeShapeType="1"/>
+          </p:cNvCxnSpPr>
+          <p:nvPr>
+            <p:extLst>
+              <p:ext uri="{386F3935-93C4-4BCD-93E2-E3B085C9AB24}">
+                <p16:designElem xmlns:p16="http://schemas.microsoft.com/office/powerpoint/2015/main" val="1"/>
+              </p:ext>
+            </p:extLst>
+          </p:nvPr>
+        </p:nvCxnSpPr>
+        <p:spPr>
+          <a:xfrm flipH="1">
+            <a:off x="838200" y="3681408"/>
+            <a:ext cx="11353799" cy="0"/>
+          </a:xfrm>
+          <a:prstGeom prst="line">
+            <a:avLst/>
+          </a:prstGeom>
+          <a:ln w="12700">
+            <a:solidFill>
+              <a:schemeClr val="accent2"/>
+            </a:solidFill>
+          </a:ln>
+        </p:spPr>
+        <p:style>
+          <a:lnRef idx="1">
+            <a:schemeClr val="accent1"/>
+          </a:lnRef>
+          <a:fillRef idx="0">
+            <a:schemeClr val="accent1"/>
+          </a:fillRef>
+          <a:effectRef idx="0">
+            <a:schemeClr val="accent1"/>
+          </a:effectRef>
+          <a:fontRef idx="minor">
+            <a:schemeClr val="tx1"/>
+          </a:fontRef>
+        </p:style>
+      </p:cxnSp>
     </p:spTree>
     <p:extLst>
       <p:ext uri="{BB962C8B-B14F-4D97-AF65-F5344CB8AC3E}">
         <p14:creationId xmlns:p14="http://schemas.microsoft.com/office/powerpoint/2010/main" val="1669163988"/>
+      </p:ext>
+    </p:extLst>
+  </p:cSld>
+  <p:clrMapOvr>
+    <a:masterClrMapping/>
+  </p:clrMapOvr>
+</p:sld>
+</file>
+
+<file path=ppt/slides/slide10.xml><?xml version="1.0" encoding="utf-8"?>
+<p:sld xmlns:a="http://schemas.openxmlformats.org/drawingml/2006/main" xmlns:r="http://schemas.openxmlformats.org/officeDocument/2006/relationships" xmlns:p="http://schemas.openxmlformats.org/presentationml/2006/main">
+  <p:cSld>
+    <p:bg>
+      <p:bgPr>
+        <a:solidFill>
+          <a:schemeClr val="bg1"/>
+        </a:solidFill>
+        <a:effectLst/>
+      </p:bgPr>
+    </p:bg>
+    <p:spTree>
+      <p:nvGrpSpPr>
+        <p:cNvPr id="1" name=""/>
+        <p:cNvGrpSpPr/>
+        <p:nvPr/>
+      </p:nvGrpSpPr>
+      <p:grpSpPr>
+        <a:xfrm>
+          <a:off x="0" y="0"/>
+          <a:ext cx="0" cy="0"/>
+          <a:chOff x="0" y="0"/>
+          <a:chExt cx="0" cy="0"/>
+        </a:xfrm>
+      </p:grpSpPr>
+      <p:pic>
+        <p:nvPicPr>
+          <p:cNvPr id="2" name="Picture 1">
+            <a:extLst>
+              <a:ext uri="{FF2B5EF4-FFF2-40B4-BE49-F238E27FC236}">
+                <a16:creationId xmlns:a16="http://schemas.microsoft.com/office/drawing/2014/main" id="{03854C0B-1D2E-41F3-BA1E-B7248AB912F0}"/>
+              </a:ext>
+            </a:extLst>
+          </p:cNvPr>
+          <p:cNvPicPr>
+            <a:picLocks noChangeAspect="1"/>
+          </p:cNvPicPr>
+          <p:nvPr/>
+        </p:nvPicPr>
+        <p:blipFill rotWithShape="1">
+          <a:blip r:embed="rId2"/>
+          <a:srcRect b="1747"/>
+          <a:stretch/>
+        </p:blipFill>
+        <p:spPr>
+          <a:xfrm>
+            <a:off x="20" y="10"/>
+            <a:ext cx="12191980" cy="6857990"/>
+          </a:xfrm>
+          <a:prstGeom prst="rect">
+            <a:avLst/>
+          </a:prstGeom>
+        </p:spPr>
+      </p:pic>
+    </p:spTree>
+    <p:extLst>
+      <p:ext uri="{BB962C8B-B14F-4D97-AF65-F5344CB8AC3E}">
+        <p14:creationId xmlns:p14="http://schemas.microsoft.com/office/powerpoint/2010/main" val="1565011391"/>
+      </p:ext>
+    </p:extLst>
+  </p:cSld>
+  <p:clrMapOvr>
+    <a:masterClrMapping/>
+  </p:clrMapOvr>
+</p:sld>
+</file>
+
+<file path=ppt/slides/slide11.xml><?xml version="1.0" encoding="utf-8"?>
+<p:sld xmlns:a="http://schemas.openxmlformats.org/drawingml/2006/main" xmlns:r="http://schemas.openxmlformats.org/officeDocument/2006/relationships" xmlns:p="http://schemas.openxmlformats.org/presentationml/2006/main">
+  <p:cSld>
+    <p:bg>
+      <p:bgPr>
+        <a:solidFill>
+          <a:schemeClr val="bg1"/>
+        </a:solidFill>
+        <a:effectLst/>
+      </p:bgPr>
+    </p:bg>
+    <p:spTree>
+      <p:nvGrpSpPr>
+        <p:cNvPr id="1" name=""/>
+        <p:cNvGrpSpPr/>
+        <p:nvPr/>
+      </p:nvGrpSpPr>
+      <p:grpSpPr>
+        <a:xfrm>
+          <a:off x="0" y="0"/>
+          <a:ext cx="0" cy="0"/>
+          <a:chOff x="0" y="0"/>
+          <a:chExt cx="0" cy="0"/>
+        </a:xfrm>
+      </p:grpSpPr>
+      <p:pic>
+        <p:nvPicPr>
+          <p:cNvPr id="2" name="Picture 1" descr="A picture containing text, map&#10;&#10;Description automatically generated">
+            <a:extLst>
+              <a:ext uri="{FF2B5EF4-FFF2-40B4-BE49-F238E27FC236}">
+                <a16:creationId xmlns:a16="http://schemas.microsoft.com/office/drawing/2014/main" id="{71968D2F-8BDF-415E-882F-E6F882DE1A32}"/>
+              </a:ext>
+            </a:extLst>
+          </p:cNvPr>
+          <p:cNvPicPr>
+            <a:picLocks noChangeAspect="1"/>
+          </p:cNvPicPr>
+          <p:nvPr/>
+        </p:nvPicPr>
+        <p:blipFill rotWithShape="1">
+          <a:blip r:embed="rId2"/>
+          <a:srcRect b="1747"/>
+          <a:stretch/>
+        </p:blipFill>
+        <p:spPr>
+          <a:xfrm>
+            <a:off x="20" y="10"/>
+            <a:ext cx="12191980" cy="6857990"/>
+          </a:xfrm>
+          <a:prstGeom prst="rect">
+            <a:avLst/>
+          </a:prstGeom>
+        </p:spPr>
+      </p:pic>
+    </p:spTree>
+    <p:extLst>
+      <p:ext uri="{BB962C8B-B14F-4D97-AF65-F5344CB8AC3E}">
+        <p14:creationId xmlns:p14="http://schemas.microsoft.com/office/powerpoint/2010/main" val="3195086968"/>
+      </p:ext>
+    </p:extLst>
+  </p:cSld>
+  <p:clrMapOvr>
+    <a:masterClrMapping/>
+  </p:clrMapOvr>
+</p:sld>
+</file>
+
+<file path=ppt/slides/slide12.xml><?xml version="1.0" encoding="utf-8"?>
+<p:sld xmlns:a="http://schemas.openxmlformats.org/drawingml/2006/main" xmlns:r="http://schemas.openxmlformats.org/officeDocument/2006/relationships" xmlns:p="http://schemas.openxmlformats.org/presentationml/2006/main">
+  <p:cSld>
+    <p:bg>
+      <p:bgPr>
+        <a:solidFill>
+          <a:schemeClr val="bg1"/>
+        </a:solidFill>
+        <a:effectLst/>
+      </p:bgPr>
+    </p:bg>
+    <p:spTree>
+      <p:nvGrpSpPr>
+        <p:cNvPr id="1" name=""/>
+        <p:cNvGrpSpPr/>
+        <p:nvPr/>
+      </p:nvGrpSpPr>
+      <p:grpSpPr>
+        <a:xfrm>
+          <a:off x="0" y="0"/>
+          <a:ext cx="0" cy="0"/>
+          <a:chOff x="0" y="0"/>
+          <a:chExt cx="0" cy="0"/>
+        </a:xfrm>
+      </p:grpSpPr>
+      <p:pic>
+        <p:nvPicPr>
+          <p:cNvPr id="3" name="Picture 2">
+            <a:extLst>
+              <a:ext uri="{FF2B5EF4-FFF2-40B4-BE49-F238E27FC236}">
+                <a16:creationId xmlns:a16="http://schemas.microsoft.com/office/drawing/2014/main" id="{A9B745A1-288A-4933-BB86-2AA49B394859}"/>
+              </a:ext>
+            </a:extLst>
+          </p:cNvPr>
+          <p:cNvPicPr>
+            <a:picLocks noChangeAspect="1"/>
+          </p:cNvPicPr>
+          <p:nvPr/>
+        </p:nvPicPr>
+        <p:blipFill rotWithShape="1">
+          <a:blip r:embed="rId2"/>
+          <a:srcRect b="1747"/>
+          <a:stretch/>
+        </p:blipFill>
+        <p:spPr>
+          <a:xfrm>
+            <a:off x="20" y="10"/>
+            <a:ext cx="12191980" cy="6857990"/>
+          </a:xfrm>
+          <a:prstGeom prst="rect">
+            <a:avLst/>
+          </a:prstGeom>
+        </p:spPr>
+      </p:pic>
+    </p:spTree>
+    <p:extLst>
+      <p:ext uri="{BB962C8B-B14F-4D97-AF65-F5344CB8AC3E}">
+        <p14:creationId xmlns:p14="http://schemas.microsoft.com/office/powerpoint/2010/main" val="3702363702"/>
       </p:ext>
     </p:extLst>
   </p:cSld>
@@ -3406,6 +3893,132 @@
           <a:chExt cx="0" cy="0"/>
         </a:xfrm>
       </p:grpSpPr>
+      <p:sp>
+        <p:nvSpPr>
+          <p:cNvPr id="10" name="Rectangle 9">
+            <a:extLst>
+              <a:ext uri="{FF2B5EF4-FFF2-40B4-BE49-F238E27FC236}">
+                <a16:creationId xmlns:a16="http://schemas.microsoft.com/office/drawing/2014/main" id="{32BC26D8-82FB-445E-AA49-62A77D7C1EE0}"/>
+              </a:ext>
+              <a:ext uri="{C183D7F6-B498-43B3-948B-1728B52AA6E4}">
+                <adec:decorative xmlns:adec="http://schemas.microsoft.com/office/drawing/2017/decorative" val="1"/>
+              </a:ext>
+            </a:extLst>
+          </p:cNvPr>
+          <p:cNvSpPr>
+            <a:spLocks noGrp="1" noRot="1" noChangeAspect="1" noMove="1" noResize="1" noEditPoints="1" noAdjustHandles="1" noChangeArrowheads="1" noChangeShapeType="1" noTextEdit="1"/>
+          </p:cNvSpPr>
+          <p:nvPr>
+            <p:extLst>
+              <p:ext uri="{386F3935-93C4-4BCD-93E2-E3B085C9AB24}">
+                <p16:designElem xmlns:p16="http://schemas.microsoft.com/office/powerpoint/2015/main" val="1"/>
+              </p:ext>
+            </p:extLst>
+          </p:nvPr>
+        </p:nvSpPr>
+        <p:spPr>
+          <a:xfrm>
+            <a:off x="0" y="0"/>
+            <a:ext cx="12192000" cy="6858000"/>
+          </a:xfrm>
+          <a:prstGeom prst="rect">
+            <a:avLst/>
+          </a:prstGeom>
+          <a:solidFill>
+            <a:srgbClr val="59343F"/>
+          </a:solidFill>
+          <a:ln>
+            <a:noFill/>
+          </a:ln>
+        </p:spPr>
+        <p:style>
+          <a:lnRef idx="2">
+            <a:schemeClr val="accent1">
+              <a:shade val="50000"/>
+            </a:schemeClr>
+          </a:lnRef>
+          <a:fillRef idx="1">
+            <a:schemeClr val="accent1"/>
+          </a:fillRef>
+          <a:effectRef idx="0">
+            <a:schemeClr val="accent1"/>
+          </a:effectRef>
+          <a:fontRef idx="minor">
+            <a:schemeClr val="lt1"/>
+          </a:fontRef>
+        </p:style>
+        <p:txBody>
+          <a:bodyPr rtlCol="0" anchor="ctr"/>
+          <a:lstStyle/>
+          <a:p>
+            <a:pPr algn="ctr"/>
+            <a:endParaRPr lang="en-US"/>
+          </a:p>
+        </p:txBody>
+      </p:sp>
+      <p:sp>
+        <p:nvSpPr>
+          <p:cNvPr id="12" name="Rectangle 11">
+            <a:extLst>
+              <a:ext uri="{FF2B5EF4-FFF2-40B4-BE49-F238E27FC236}">
+                <a16:creationId xmlns:a16="http://schemas.microsoft.com/office/drawing/2014/main" id="{CB44330D-EA18-4254-AA95-EB49948539B8}"/>
+              </a:ext>
+              <a:ext uri="{C183D7F6-B498-43B3-948B-1728B52AA6E4}">
+                <adec:decorative xmlns:adec="http://schemas.microsoft.com/office/drawing/2017/decorative" val="1"/>
+              </a:ext>
+            </a:extLst>
+          </p:cNvPr>
+          <p:cNvSpPr>
+            <a:spLocks noGrp="1" noRot="1" noChangeAspect="1" noMove="1" noResize="1" noEditPoints="1" noAdjustHandles="1" noChangeArrowheads="1" noChangeShapeType="1" noTextEdit="1"/>
+          </p:cNvSpPr>
+          <p:nvPr>
+            <p:extLst>
+              <p:ext uri="{386F3935-93C4-4BCD-93E2-E3B085C9AB24}">
+                <p16:designElem xmlns:p16="http://schemas.microsoft.com/office/powerpoint/2015/main" val="1"/>
+              </p:ext>
+            </p:extLst>
+          </p:nvPr>
+        </p:nvSpPr>
+        <p:spPr>
+          <a:xfrm>
+            <a:off x="477012" y="480060"/>
+            <a:ext cx="11237976" cy="5897880"/>
+          </a:xfrm>
+          <a:prstGeom prst="rect">
+            <a:avLst/>
+          </a:prstGeom>
+          <a:solidFill>
+            <a:srgbClr val="FFFFFF"/>
+          </a:solidFill>
+          <a:ln>
+            <a:noFill/>
+          </a:ln>
+        </p:spPr>
+        <p:style>
+          <a:lnRef idx="2">
+            <a:schemeClr val="accent1">
+              <a:shade val="50000"/>
+            </a:schemeClr>
+          </a:lnRef>
+          <a:fillRef idx="1">
+            <a:schemeClr val="accent1"/>
+          </a:fillRef>
+          <a:effectRef idx="0">
+            <a:schemeClr val="accent1"/>
+          </a:effectRef>
+          <a:fontRef idx="minor">
+            <a:schemeClr val="lt1"/>
+          </a:fontRef>
+        </p:style>
+        <p:txBody>
+          <a:bodyPr rtlCol="0" anchor="ctr"/>
+          <a:lstStyle/>
+          <a:p>
+            <a:pPr algn="ctr"/>
+            <a:endParaRPr lang="en-US"/>
+          </a:p>
+        </p:txBody>
+      </p:sp>
       <p:pic>
         <p:nvPicPr>
           <p:cNvPr id="5" name="Picture 4">
@@ -3427,8 +4040,8 @@
         </p:blipFill>
         <p:spPr>
           <a:xfrm>
-            <a:off x="20" y="10"/>
-            <a:ext cx="12191980" cy="6857990"/>
+            <a:off x="1143913" y="643467"/>
+            <a:ext cx="9904173" cy="5571066"/>
           </a:xfrm>
           <a:prstGeom prst="rect">
             <a:avLst/>
@@ -3473,6 +4086,132 @@
           <a:chExt cx="0" cy="0"/>
         </a:xfrm>
       </p:grpSpPr>
+      <p:sp>
+        <p:nvSpPr>
+          <p:cNvPr id="14" name="Rectangle 9">
+            <a:extLst>
+              <a:ext uri="{FF2B5EF4-FFF2-40B4-BE49-F238E27FC236}">
+                <a16:creationId xmlns:a16="http://schemas.microsoft.com/office/drawing/2014/main" id="{32BC26D8-82FB-445E-AA49-62A77D7C1EE0}"/>
+              </a:ext>
+              <a:ext uri="{C183D7F6-B498-43B3-948B-1728B52AA6E4}">
+                <adec:decorative xmlns:adec="http://schemas.microsoft.com/office/drawing/2017/decorative" val="1"/>
+              </a:ext>
+            </a:extLst>
+          </p:cNvPr>
+          <p:cNvSpPr>
+            <a:spLocks noGrp="1" noRot="1" noChangeAspect="1" noMove="1" noResize="1" noEditPoints="1" noAdjustHandles="1" noChangeArrowheads="1" noChangeShapeType="1" noTextEdit="1"/>
+          </p:cNvSpPr>
+          <p:nvPr>
+            <p:extLst>
+              <p:ext uri="{386F3935-93C4-4BCD-93E2-E3B085C9AB24}">
+                <p16:designElem xmlns:p16="http://schemas.microsoft.com/office/powerpoint/2015/main" val="1"/>
+              </p:ext>
+            </p:extLst>
+          </p:nvPr>
+        </p:nvSpPr>
+        <p:spPr>
+          <a:xfrm>
+            <a:off x="0" y="0"/>
+            <a:ext cx="12192000" cy="6858000"/>
+          </a:xfrm>
+          <a:prstGeom prst="rect">
+            <a:avLst/>
+          </a:prstGeom>
+          <a:solidFill>
+            <a:srgbClr val="59343F"/>
+          </a:solidFill>
+          <a:ln>
+            <a:noFill/>
+          </a:ln>
+        </p:spPr>
+        <p:style>
+          <a:lnRef idx="2">
+            <a:schemeClr val="accent1">
+              <a:shade val="50000"/>
+            </a:schemeClr>
+          </a:lnRef>
+          <a:fillRef idx="1">
+            <a:schemeClr val="accent1"/>
+          </a:fillRef>
+          <a:effectRef idx="0">
+            <a:schemeClr val="accent1"/>
+          </a:effectRef>
+          <a:fontRef idx="minor">
+            <a:schemeClr val="lt1"/>
+          </a:fontRef>
+        </p:style>
+        <p:txBody>
+          <a:bodyPr rtlCol="0" anchor="ctr"/>
+          <a:lstStyle/>
+          <a:p>
+            <a:pPr algn="ctr"/>
+            <a:endParaRPr lang="en-US"/>
+          </a:p>
+        </p:txBody>
+      </p:sp>
+      <p:sp>
+        <p:nvSpPr>
+          <p:cNvPr id="15" name="Rectangle 11">
+            <a:extLst>
+              <a:ext uri="{FF2B5EF4-FFF2-40B4-BE49-F238E27FC236}">
+                <a16:creationId xmlns:a16="http://schemas.microsoft.com/office/drawing/2014/main" id="{CB44330D-EA18-4254-AA95-EB49948539B8}"/>
+              </a:ext>
+              <a:ext uri="{C183D7F6-B498-43B3-948B-1728B52AA6E4}">
+                <adec:decorative xmlns:adec="http://schemas.microsoft.com/office/drawing/2017/decorative" val="1"/>
+              </a:ext>
+            </a:extLst>
+          </p:cNvPr>
+          <p:cNvSpPr>
+            <a:spLocks noGrp="1" noRot="1" noChangeAspect="1" noMove="1" noResize="1" noEditPoints="1" noAdjustHandles="1" noChangeArrowheads="1" noChangeShapeType="1" noTextEdit="1"/>
+          </p:cNvSpPr>
+          <p:nvPr>
+            <p:extLst>
+              <p:ext uri="{386F3935-93C4-4BCD-93E2-E3B085C9AB24}">
+                <p16:designElem xmlns:p16="http://schemas.microsoft.com/office/powerpoint/2015/main" val="1"/>
+              </p:ext>
+            </p:extLst>
+          </p:nvPr>
+        </p:nvSpPr>
+        <p:spPr>
+          <a:xfrm>
+            <a:off x="477012" y="480060"/>
+            <a:ext cx="11237976" cy="5897880"/>
+          </a:xfrm>
+          <a:prstGeom prst="rect">
+            <a:avLst/>
+          </a:prstGeom>
+          <a:solidFill>
+            <a:srgbClr val="FFFFFF"/>
+          </a:solidFill>
+          <a:ln>
+            <a:noFill/>
+          </a:ln>
+        </p:spPr>
+        <p:style>
+          <a:lnRef idx="2">
+            <a:schemeClr val="accent1">
+              <a:shade val="50000"/>
+            </a:schemeClr>
+          </a:lnRef>
+          <a:fillRef idx="1">
+            <a:schemeClr val="accent1"/>
+          </a:fillRef>
+          <a:effectRef idx="0">
+            <a:schemeClr val="accent1"/>
+          </a:effectRef>
+          <a:fontRef idx="minor">
+            <a:schemeClr val="lt1"/>
+          </a:fontRef>
+        </p:style>
+        <p:txBody>
+          <a:bodyPr rtlCol="0" anchor="ctr"/>
+          <a:lstStyle/>
+          <a:p>
+            <a:pPr algn="ctr"/>
+            <a:endParaRPr lang="en-US"/>
+          </a:p>
+        </p:txBody>
+      </p:sp>
       <p:pic>
         <p:nvPicPr>
           <p:cNvPr id="5" name="Picture 4">
@@ -3494,8 +4233,8 @@
         </p:blipFill>
         <p:spPr>
           <a:xfrm>
-            <a:off x="20" y="10"/>
-            <a:ext cx="12191980" cy="6857990"/>
+            <a:off x="1143913" y="643467"/>
+            <a:ext cx="9904173" cy="5571066"/>
           </a:xfrm>
           <a:prstGeom prst="rect">
             <a:avLst/>
@@ -3521,7 +4260,10 @@
     <p:bg>
       <p:bgPr>
         <a:solidFill>
-          <a:schemeClr val="bg1"/>
+          <a:schemeClr val="bg1">
+            <a:tint val="95000"/>
+            <a:satMod val="170000"/>
+          </a:schemeClr>
         </a:solidFill>
         <a:effectLst/>
       </p:bgPr>
@@ -3556,13 +4298,13 @@
         </p:nvPicPr>
         <p:blipFill rotWithShape="1">
           <a:blip r:embed="rId2"/>
-          <a:srcRect b="3434"/>
+          <a:srcRect r="-1" b="7617"/>
           <a:stretch/>
         </p:blipFill>
         <p:spPr>
           <a:xfrm>
-            <a:off x="20" y="10"/>
-            <a:ext cx="12191980" cy="6857990"/>
+            <a:off x="321733" y="321733"/>
+            <a:ext cx="11548534" cy="6214534"/>
           </a:xfrm>
           <a:prstGeom prst="rect">
             <a:avLst/>
@@ -3577,7 +4319,7 @@
     </p:extLst>
   </p:cSld>
   <p:clrMapOvr>
-    <a:masterClrMapping/>
+    <a:overrideClrMapping bg1="dk1" tx1="lt1" bg2="dk2" tx2="lt2" accent1="accent1" accent2="accent2" accent3="accent3" accent4="accent4" accent5="accent5" accent6="accent6" hlink="hlink" folHlink="folHlink"/>
   </p:clrMapOvr>
 </p:sld>
 </file>
@@ -3607,6 +4349,132 @@
           <a:chExt cx="0" cy="0"/>
         </a:xfrm>
       </p:grpSpPr>
+      <p:sp>
+        <p:nvSpPr>
+          <p:cNvPr id="12" name="Rectangle 11">
+            <a:extLst>
+              <a:ext uri="{FF2B5EF4-FFF2-40B4-BE49-F238E27FC236}">
+                <a16:creationId xmlns:a16="http://schemas.microsoft.com/office/drawing/2014/main" id="{32BC26D8-82FB-445E-AA49-62A77D7C1EE0}"/>
+              </a:ext>
+              <a:ext uri="{C183D7F6-B498-43B3-948B-1728B52AA6E4}">
+                <adec:decorative xmlns:adec="http://schemas.microsoft.com/office/drawing/2017/decorative" val="1"/>
+              </a:ext>
+            </a:extLst>
+          </p:cNvPr>
+          <p:cNvSpPr>
+            <a:spLocks noGrp="1" noRot="1" noChangeAspect="1" noMove="1" noResize="1" noEditPoints="1" noAdjustHandles="1" noChangeArrowheads="1" noChangeShapeType="1" noTextEdit="1"/>
+          </p:cNvSpPr>
+          <p:nvPr>
+            <p:extLst>
+              <p:ext uri="{386F3935-93C4-4BCD-93E2-E3B085C9AB24}">
+                <p16:designElem xmlns:p16="http://schemas.microsoft.com/office/powerpoint/2015/main" val="1"/>
+              </p:ext>
+            </p:extLst>
+          </p:nvPr>
+        </p:nvSpPr>
+        <p:spPr>
+          <a:xfrm>
+            <a:off x="0" y="0"/>
+            <a:ext cx="12192000" cy="6858000"/>
+          </a:xfrm>
+          <a:prstGeom prst="rect">
+            <a:avLst/>
+          </a:prstGeom>
+          <a:solidFill>
+            <a:srgbClr val="59343F"/>
+          </a:solidFill>
+          <a:ln>
+            <a:noFill/>
+          </a:ln>
+        </p:spPr>
+        <p:style>
+          <a:lnRef idx="2">
+            <a:schemeClr val="accent1">
+              <a:shade val="50000"/>
+            </a:schemeClr>
+          </a:lnRef>
+          <a:fillRef idx="1">
+            <a:schemeClr val="accent1"/>
+          </a:fillRef>
+          <a:effectRef idx="0">
+            <a:schemeClr val="accent1"/>
+          </a:effectRef>
+          <a:fontRef idx="minor">
+            <a:schemeClr val="lt1"/>
+          </a:fontRef>
+        </p:style>
+        <p:txBody>
+          <a:bodyPr rtlCol="0" anchor="ctr"/>
+          <a:lstStyle/>
+          <a:p>
+            <a:pPr algn="ctr"/>
+            <a:endParaRPr lang="en-US"/>
+          </a:p>
+        </p:txBody>
+      </p:sp>
+      <p:sp>
+        <p:nvSpPr>
+          <p:cNvPr id="14" name="Rectangle 13">
+            <a:extLst>
+              <a:ext uri="{FF2B5EF4-FFF2-40B4-BE49-F238E27FC236}">
+                <a16:creationId xmlns:a16="http://schemas.microsoft.com/office/drawing/2014/main" id="{CB44330D-EA18-4254-AA95-EB49948539B8}"/>
+              </a:ext>
+              <a:ext uri="{C183D7F6-B498-43B3-948B-1728B52AA6E4}">
+                <adec:decorative xmlns:adec="http://schemas.microsoft.com/office/drawing/2017/decorative" val="1"/>
+              </a:ext>
+            </a:extLst>
+          </p:cNvPr>
+          <p:cNvSpPr>
+            <a:spLocks noGrp="1" noRot="1" noChangeAspect="1" noMove="1" noResize="1" noEditPoints="1" noAdjustHandles="1" noChangeArrowheads="1" noChangeShapeType="1" noTextEdit="1"/>
+          </p:cNvSpPr>
+          <p:nvPr>
+            <p:extLst>
+              <p:ext uri="{386F3935-93C4-4BCD-93E2-E3B085C9AB24}">
+                <p16:designElem xmlns:p16="http://schemas.microsoft.com/office/powerpoint/2015/main" val="1"/>
+              </p:ext>
+            </p:extLst>
+          </p:nvPr>
+        </p:nvSpPr>
+        <p:spPr>
+          <a:xfrm>
+            <a:off x="477012" y="480060"/>
+            <a:ext cx="11237976" cy="5897880"/>
+          </a:xfrm>
+          <a:prstGeom prst="rect">
+            <a:avLst/>
+          </a:prstGeom>
+          <a:solidFill>
+            <a:srgbClr val="FFFFFF"/>
+          </a:solidFill>
+          <a:ln>
+            <a:noFill/>
+          </a:ln>
+        </p:spPr>
+        <p:style>
+          <a:lnRef idx="2">
+            <a:schemeClr val="accent1">
+              <a:shade val="50000"/>
+            </a:schemeClr>
+          </a:lnRef>
+          <a:fillRef idx="1">
+            <a:schemeClr val="accent1"/>
+          </a:fillRef>
+          <a:effectRef idx="0">
+            <a:schemeClr val="accent1"/>
+          </a:effectRef>
+          <a:fontRef idx="minor">
+            <a:schemeClr val="lt1"/>
+          </a:fontRef>
+        </p:style>
+        <p:txBody>
+          <a:bodyPr rtlCol="0" anchor="ctr"/>
+          <a:lstStyle/>
+          <a:p>
+            <a:pPr algn="ctr"/>
+            <a:endParaRPr lang="en-US"/>
+          </a:p>
+        </p:txBody>
+      </p:sp>
       <p:pic>
         <p:nvPicPr>
           <p:cNvPr id="7" name="Picture 6" descr="A close up of a map&#10;&#10;Description automatically generated">
@@ -3628,8 +4496,8 @@
         </p:blipFill>
         <p:spPr>
           <a:xfrm>
-            <a:off x="20" y="10"/>
-            <a:ext cx="12191980" cy="6857990"/>
+            <a:off x="1143913" y="643467"/>
+            <a:ext cx="9904173" cy="5571066"/>
           </a:xfrm>
           <a:prstGeom prst="rect">
             <a:avLst/>
@@ -3652,6 +4520,14 @@
 <file path=ppt/slides/slide6.xml><?xml version="1.0" encoding="utf-8"?>
 <p:sld xmlns:a="http://schemas.openxmlformats.org/drawingml/2006/main" xmlns:r="http://schemas.openxmlformats.org/officeDocument/2006/relationships" xmlns:p="http://schemas.openxmlformats.org/presentationml/2006/main">
   <p:cSld>
+    <p:bg>
+      <p:bgPr>
+        <a:solidFill>
+          <a:schemeClr val="bg1"/>
+        </a:solidFill>
+        <a:effectLst/>
+      </p:bgPr>
+    </p:bg>
     <p:spTree>
       <p:nvGrpSpPr>
         <p:cNvPr id="1" name=""/>
@@ -3668,42 +4544,163 @@
       </p:grpSpPr>
       <p:sp>
         <p:nvSpPr>
-          <p:cNvPr id="2" name="Title 1">
-            <a:extLst>
-              <a:ext uri="{FF2B5EF4-FFF2-40B4-BE49-F238E27FC236}">
-                <a16:creationId xmlns:a16="http://schemas.microsoft.com/office/drawing/2014/main" id="{3B79B498-7C8F-4E3E-9C2F-AB054199B537}"/>
-              </a:ext>
-            </a:extLst>
-          </p:cNvPr>
-          <p:cNvSpPr>
-            <a:spLocks noGrp="1"/>
-          </p:cNvSpPr>
-          <p:nvPr>
-            <p:ph type="title"/>
+          <p:cNvPr id="10" name="Rectangle 9">
+            <a:extLst>
+              <a:ext uri="{FF2B5EF4-FFF2-40B4-BE49-F238E27FC236}">
+                <a16:creationId xmlns:a16="http://schemas.microsoft.com/office/drawing/2014/main" id="{32BC26D8-82FB-445E-AA49-62A77D7C1EE0}"/>
+              </a:ext>
+              <a:ext uri="{C183D7F6-B498-43B3-948B-1728B52AA6E4}">
+                <adec:decorative xmlns:adec="http://schemas.microsoft.com/office/drawing/2017/decorative" val="1"/>
+              </a:ext>
+            </a:extLst>
+          </p:cNvPr>
+          <p:cNvSpPr>
+            <a:spLocks noGrp="1" noRot="1" noChangeAspect="1" noMove="1" noResize="1" noEditPoints="1" noAdjustHandles="1" noChangeArrowheads="1" noChangeShapeType="1" noTextEdit="1"/>
+          </p:cNvSpPr>
+          <p:nvPr>
+            <p:extLst>
+              <p:ext uri="{386F3935-93C4-4BCD-93E2-E3B085C9AB24}">
+                <p16:designElem xmlns:p16="http://schemas.microsoft.com/office/powerpoint/2015/main" val="1"/>
+              </p:ext>
+            </p:extLst>
           </p:nvPr>
         </p:nvSpPr>
         <p:spPr>
           <a:xfrm>
-            <a:off x="838200" y="2766218"/>
-            <a:ext cx="10515600" cy="1325563"/>
+            <a:off x="0" y="0"/>
+            <a:ext cx="12192000" cy="6858000"/>
           </a:xfrm>
+          <a:prstGeom prst="rect">
+            <a:avLst/>
+          </a:prstGeom>
+          <a:solidFill>
+            <a:srgbClr val="445952"/>
+          </a:solidFill>
+          <a:ln>
+            <a:noFill/>
+          </a:ln>
         </p:spPr>
-        <p:txBody>
-          <a:bodyPr/>
+        <p:style>
+          <a:lnRef idx="2">
+            <a:schemeClr val="accent1">
+              <a:shade val="50000"/>
+            </a:schemeClr>
+          </a:lnRef>
+          <a:fillRef idx="1">
+            <a:schemeClr val="accent1"/>
+          </a:fillRef>
+          <a:effectRef idx="0">
+            <a:schemeClr val="accent1"/>
+          </a:effectRef>
+          <a:fontRef idx="minor">
+            <a:schemeClr val="lt1"/>
+          </a:fontRef>
+        </p:style>
+        <p:txBody>
+          <a:bodyPr rtlCol="0" anchor="ctr"/>
           <a:lstStyle/>
           <a:p>
             <a:pPr algn="ctr"/>
-            <a:r>
-              <a:rPr lang="en-US" dirty="0"/>
-              <a:t>Percent of State Population Infected with COVID-19</a:t>
-            </a:r>
-          </a:p>
-        </p:txBody>
-      </p:sp>
+            <a:endParaRPr lang="en-US"/>
+          </a:p>
+        </p:txBody>
+      </p:sp>
+      <p:sp>
+        <p:nvSpPr>
+          <p:cNvPr id="12" name="Rectangle 11">
+            <a:extLst>
+              <a:ext uri="{FF2B5EF4-FFF2-40B4-BE49-F238E27FC236}">
+                <a16:creationId xmlns:a16="http://schemas.microsoft.com/office/drawing/2014/main" id="{CB44330D-EA18-4254-AA95-EB49948539B8}"/>
+              </a:ext>
+              <a:ext uri="{C183D7F6-B498-43B3-948B-1728B52AA6E4}">
+                <adec:decorative xmlns:adec="http://schemas.microsoft.com/office/drawing/2017/decorative" val="1"/>
+              </a:ext>
+            </a:extLst>
+          </p:cNvPr>
+          <p:cNvSpPr>
+            <a:spLocks noGrp="1" noRot="1" noChangeAspect="1" noMove="1" noResize="1" noEditPoints="1" noAdjustHandles="1" noChangeArrowheads="1" noChangeShapeType="1" noTextEdit="1"/>
+          </p:cNvSpPr>
+          <p:nvPr>
+            <p:extLst>
+              <p:ext uri="{386F3935-93C4-4BCD-93E2-E3B085C9AB24}">
+                <p16:designElem xmlns:p16="http://schemas.microsoft.com/office/powerpoint/2015/main" val="1"/>
+              </p:ext>
+            </p:extLst>
+          </p:nvPr>
+        </p:nvSpPr>
+        <p:spPr>
+          <a:xfrm>
+            <a:off x="477012" y="480060"/>
+            <a:ext cx="11237976" cy="5897880"/>
+          </a:xfrm>
+          <a:prstGeom prst="rect">
+            <a:avLst/>
+          </a:prstGeom>
+          <a:solidFill>
+            <a:srgbClr val="FFFFFF"/>
+          </a:solidFill>
+          <a:ln>
+            <a:noFill/>
+          </a:ln>
+        </p:spPr>
+        <p:style>
+          <a:lnRef idx="2">
+            <a:schemeClr val="accent1">
+              <a:shade val="50000"/>
+            </a:schemeClr>
+          </a:lnRef>
+          <a:fillRef idx="1">
+            <a:schemeClr val="accent1"/>
+          </a:fillRef>
+          <a:effectRef idx="0">
+            <a:schemeClr val="accent1"/>
+          </a:effectRef>
+          <a:fontRef idx="minor">
+            <a:schemeClr val="lt1"/>
+          </a:fontRef>
+        </p:style>
+        <p:txBody>
+          <a:bodyPr rtlCol="0" anchor="ctr"/>
+          <a:lstStyle/>
+          <a:p>
+            <a:pPr algn="ctr"/>
+            <a:endParaRPr lang="en-US"/>
+          </a:p>
+        </p:txBody>
+      </p:sp>
+      <p:pic>
+        <p:nvPicPr>
+          <p:cNvPr id="5" name="Picture 4">
+            <a:extLst>
+              <a:ext uri="{FF2B5EF4-FFF2-40B4-BE49-F238E27FC236}">
+                <a16:creationId xmlns:a16="http://schemas.microsoft.com/office/drawing/2014/main" id="{2E73B976-482F-4ECC-822F-82246109B7F1}"/>
+              </a:ext>
+            </a:extLst>
+          </p:cNvPr>
+          <p:cNvPicPr>
+            <a:picLocks noChangeAspect="1"/>
+          </p:cNvPicPr>
+          <p:nvPr/>
+        </p:nvPicPr>
+        <p:blipFill rotWithShape="1">
+          <a:blip r:embed="rId2"/>
+          <a:srcRect l="639" t="10612" r="1452" b="8421"/>
+          <a:stretch/>
+        </p:blipFill>
+        <p:spPr>
+          <a:xfrm>
+            <a:off x="962025" y="656165"/>
+            <a:ext cx="10086974" cy="5651386"/>
+          </a:xfrm>
+          <a:prstGeom prst="rect">
+            <a:avLst/>
+          </a:prstGeom>
+        </p:spPr>
+      </p:pic>
     </p:spTree>
     <p:extLst>
       <p:ext uri="{BB962C8B-B14F-4D97-AF65-F5344CB8AC3E}">
-        <p14:creationId xmlns:p14="http://schemas.microsoft.com/office/powerpoint/2010/main" val="411004835"/>
+        <p14:creationId xmlns:p14="http://schemas.microsoft.com/office/powerpoint/2010/main" val="217660685"/>
       </p:ext>
     </p:extLst>
   </p:cSld>
@@ -3738,12 +4735,138 @@
           <a:chExt cx="0" cy="0"/>
         </a:xfrm>
       </p:grpSpPr>
+      <p:sp>
+        <p:nvSpPr>
+          <p:cNvPr id="8" name="Rectangle 7">
+            <a:extLst>
+              <a:ext uri="{FF2B5EF4-FFF2-40B4-BE49-F238E27FC236}">
+                <a16:creationId xmlns:a16="http://schemas.microsoft.com/office/drawing/2014/main" id="{32BC26D8-82FB-445E-AA49-62A77D7C1EE0}"/>
+              </a:ext>
+              <a:ext uri="{C183D7F6-B498-43B3-948B-1728B52AA6E4}">
+                <adec:decorative xmlns:adec="http://schemas.microsoft.com/office/drawing/2017/decorative" val="1"/>
+              </a:ext>
+            </a:extLst>
+          </p:cNvPr>
+          <p:cNvSpPr>
+            <a:spLocks noGrp="1" noRot="1" noChangeAspect="1" noMove="1" noResize="1" noEditPoints="1" noAdjustHandles="1" noChangeArrowheads="1" noChangeShapeType="1" noTextEdit="1"/>
+          </p:cNvSpPr>
+          <p:nvPr>
+            <p:extLst>
+              <p:ext uri="{386F3935-93C4-4BCD-93E2-E3B085C9AB24}">
+                <p16:designElem xmlns:p16="http://schemas.microsoft.com/office/powerpoint/2015/main" val="1"/>
+              </p:ext>
+            </p:extLst>
+          </p:nvPr>
+        </p:nvSpPr>
+        <p:spPr>
+          <a:xfrm>
+            <a:off x="0" y="0"/>
+            <a:ext cx="12192000" cy="6858000"/>
+          </a:xfrm>
+          <a:prstGeom prst="rect">
+            <a:avLst/>
+          </a:prstGeom>
+          <a:solidFill>
+            <a:srgbClr val="475A54"/>
+          </a:solidFill>
+          <a:ln>
+            <a:noFill/>
+          </a:ln>
+        </p:spPr>
+        <p:style>
+          <a:lnRef idx="2">
+            <a:schemeClr val="accent1">
+              <a:shade val="50000"/>
+            </a:schemeClr>
+          </a:lnRef>
+          <a:fillRef idx="1">
+            <a:schemeClr val="accent1"/>
+          </a:fillRef>
+          <a:effectRef idx="0">
+            <a:schemeClr val="accent1"/>
+          </a:effectRef>
+          <a:fontRef idx="minor">
+            <a:schemeClr val="lt1"/>
+          </a:fontRef>
+        </p:style>
+        <p:txBody>
+          <a:bodyPr rtlCol="0" anchor="ctr"/>
+          <a:lstStyle/>
+          <a:p>
+            <a:pPr algn="ctr"/>
+            <a:endParaRPr lang="en-US"/>
+          </a:p>
+        </p:txBody>
+      </p:sp>
+      <p:sp>
+        <p:nvSpPr>
+          <p:cNvPr id="10" name="Rectangle 9">
+            <a:extLst>
+              <a:ext uri="{FF2B5EF4-FFF2-40B4-BE49-F238E27FC236}">
+                <a16:creationId xmlns:a16="http://schemas.microsoft.com/office/drawing/2014/main" id="{CB44330D-EA18-4254-AA95-EB49948539B8}"/>
+              </a:ext>
+              <a:ext uri="{C183D7F6-B498-43B3-948B-1728B52AA6E4}">
+                <adec:decorative xmlns:adec="http://schemas.microsoft.com/office/drawing/2017/decorative" val="1"/>
+              </a:ext>
+            </a:extLst>
+          </p:cNvPr>
+          <p:cNvSpPr>
+            <a:spLocks noGrp="1" noRot="1" noChangeAspect="1" noMove="1" noResize="1" noEditPoints="1" noAdjustHandles="1" noChangeArrowheads="1" noChangeShapeType="1" noTextEdit="1"/>
+          </p:cNvSpPr>
+          <p:nvPr>
+            <p:extLst>
+              <p:ext uri="{386F3935-93C4-4BCD-93E2-E3B085C9AB24}">
+                <p16:designElem xmlns:p16="http://schemas.microsoft.com/office/powerpoint/2015/main" val="1"/>
+              </p:ext>
+            </p:extLst>
+          </p:nvPr>
+        </p:nvSpPr>
+        <p:spPr>
+          <a:xfrm>
+            <a:off x="477012" y="480060"/>
+            <a:ext cx="11237976" cy="5897880"/>
+          </a:xfrm>
+          <a:prstGeom prst="rect">
+            <a:avLst/>
+          </a:prstGeom>
+          <a:solidFill>
+            <a:srgbClr val="FFFFFF"/>
+          </a:solidFill>
+          <a:ln>
+            <a:noFill/>
+          </a:ln>
+        </p:spPr>
+        <p:style>
+          <a:lnRef idx="2">
+            <a:schemeClr val="accent1">
+              <a:shade val="50000"/>
+            </a:schemeClr>
+          </a:lnRef>
+          <a:fillRef idx="1">
+            <a:schemeClr val="accent1"/>
+          </a:fillRef>
+          <a:effectRef idx="0">
+            <a:schemeClr val="accent1"/>
+          </a:effectRef>
+          <a:fontRef idx="minor">
+            <a:schemeClr val="lt1"/>
+          </a:fontRef>
+        </p:style>
+        <p:txBody>
+          <a:bodyPr rtlCol="0" anchor="ctr"/>
+          <a:lstStyle/>
+          <a:p>
+            <a:pPr algn="ctr"/>
+            <a:endParaRPr lang="en-US"/>
+          </a:p>
+        </p:txBody>
+      </p:sp>
       <p:pic>
         <p:nvPicPr>
-          <p:cNvPr id="2" name="Picture 1">
-            <a:extLst>
-              <a:ext uri="{FF2B5EF4-FFF2-40B4-BE49-F238E27FC236}">
-                <a16:creationId xmlns:a16="http://schemas.microsoft.com/office/drawing/2014/main" id="{03854C0B-1D2E-41F3-BA1E-B7248AB912F0}"/>
+          <p:cNvPr id="3" name="Picture 2">
+            <a:extLst>
+              <a:ext uri="{FF2B5EF4-FFF2-40B4-BE49-F238E27FC236}">
+                <a16:creationId xmlns:a16="http://schemas.microsoft.com/office/drawing/2014/main" id="{36153978-673F-45E1-93BA-1FA02CFAEFCA}"/>
               </a:ext>
             </a:extLst>
           </p:cNvPr>
@@ -3752,15 +4875,16 @@
           </p:cNvPicPr>
           <p:nvPr/>
         </p:nvPicPr>
-        <p:blipFill rotWithShape="1">
+        <p:blipFill>
           <a:blip r:embed="rId2"/>
-          <a:srcRect b="1747"/>
-          <a:stretch/>
+          <a:stretch>
+            <a:fillRect/>
+          </a:stretch>
         </p:blipFill>
         <p:spPr>
           <a:xfrm>
-            <a:off x="20" y="10"/>
-            <a:ext cx="12191980" cy="6857990"/>
+            <a:off x="1984512" y="643467"/>
+            <a:ext cx="8222975" cy="5571066"/>
           </a:xfrm>
           <a:prstGeom prst="rect">
             <a:avLst/>
@@ -3770,7 +4894,7 @@
     </p:spTree>
     <p:extLst>
       <p:ext uri="{BB962C8B-B14F-4D97-AF65-F5344CB8AC3E}">
-        <p14:creationId xmlns:p14="http://schemas.microsoft.com/office/powerpoint/2010/main" val="1565011391"/>
+        <p14:creationId xmlns:p14="http://schemas.microsoft.com/office/powerpoint/2010/main" val="3270005722"/>
       </p:ext>
     </p:extLst>
   </p:cSld>
@@ -3807,10 +4931,10 @@
       </p:grpSpPr>
       <p:pic>
         <p:nvPicPr>
-          <p:cNvPr id="2" name="Picture 1" descr="A picture containing text, map&#10;&#10;Description automatically generated">
-            <a:extLst>
-              <a:ext uri="{FF2B5EF4-FFF2-40B4-BE49-F238E27FC236}">
-                <a16:creationId xmlns:a16="http://schemas.microsoft.com/office/drawing/2014/main" id="{71968D2F-8BDF-415E-882F-E6F882DE1A32}"/>
+          <p:cNvPr id="2" name="Picture 1">
+            <a:extLst>
+              <a:ext uri="{FF2B5EF4-FFF2-40B4-BE49-F238E27FC236}">
+                <a16:creationId xmlns:a16="http://schemas.microsoft.com/office/drawing/2014/main" id="{37346462-24AB-44CD-9427-31D0B43D14FD}"/>
               </a:ext>
             </a:extLst>
           </p:cNvPr>
@@ -3819,15 +4943,16 @@
           </p:cNvPicPr>
           <p:nvPr/>
         </p:nvPicPr>
-        <p:blipFill rotWithShape="1">
+        <p:blipFill>
           <a:blip r:embed="rId2"/>
-          <a:srcRect b="1747"/>
-          <a:stretch/>
+          <a:stretch>
+            <a:fillRect/>
+          </a:stretch>
         </p:blipFill>
         <p:spPr>
           <a:xfrm>
-            <a:off x="20" y="10"/>
-            <a:ext cx="12191980" cy="6857990"/>
+            <a:off x="336685" y="-416381"/>
+            <a:ext cx="11064739" cy="7274381"/>
           </a:xfrm>
           <a:prstGeom prst="rect">
             <a:avLst/>
@@ -3837,7 +4962,7 @@
     </p:spTree>
     <p:extLst>
       <p:ext uri="{BB962C8B-B14F-4D97-AF65-F5344CB8AC3E}">
-        <p14:creationId xmlns:p14="http://schemas.microsoft.com/office/powerpoint/2010/main" val="3195086968"/>
+        <p14:creationId xmlns:p14="http://schemas.microsoft.com/office/powerpoint/2010/main" val="2224074667"/>
       </p:ext>
     </p:extLst>
   </p:cSld>
@@ -3850,14 +4975,6 @@
 <file path=ppt/slides/slide9.xml><?xml version="1.0" encoding="utf-8"?>
 <p:sld xmlns:a="http://schemas.openxmlformats.org/drawingml/2006/main" xmlns:r="http://schemas.openxmlformats.org/officeDocument/2006/relationships" xmlns:p="http://schemas.openxmlformats.org/presentationml/2006/main">
   <p:cSld>
-    <p:bg>
-      <p:bgPr>
-        <a:solidFill>
-          <a:schemeClr val="bg1"/>
-        </a:solidFill>
-        <a:effectLst/>
-      </p:bgPr>
-    </p:bg>
     <p:spTree>
       <p:nvGrpSpPr>
         <p:cNvPr id="1" name=""/>
@@ -3872,39 +4989,44 @@
           <a:chExt cx="0" cy="0"/>
         </a:xfrm>
       </p:grpSpPr>
-      <p:pic>
-        <p:nvPicPr>
-          <p:cNvPr id="3" name="Picture 2">
-            <a:extLst>
-              <a:ext uri="{FF2B5EF4-FFF2-40B4-BE49-F238E27FC236}">
-                <a16:creationId xmlns:a16="http://schemas.microsoft.com/office/drawing/2014/main" id="{A9B745A1-288A-4933-BB86-2AA49B394859}"/>
-              </a:ext>
-            </a:extLst>
-          </p:cNvPr>
-          <p:cNvPicPr>
-            <a:picLocks noChangeAspect="1"/>
-          </p:cNvPicPr>
-          <p:nvPr/>
-        </p:nvPicPr>
-        <p:blipFill rotWithShape="1">
-          <a:blip r:embed="rId2"/>
-          <a:srcRect b="1747"/>
-          <a:stretch/>
-        </p:blipFill>
+      <p:sp>
+        <p:nvSpPr>
+          <p:cNvPr id="2" name="Title 1">
+            <a:extLst>
+              <a:ext uri="{FF2B5EF4-FFF2-40B4-BE49-F238E27FC236}">
+                <a16:creationId xmlns:a16="http://schemas.microsoft.com/office/drawing/2014/main" id="{3B79B498-7C8F-4E3E-9C2F-AB054199B537}"/>
+              </a:ext>
+            </a:extLst>
+          </p:cNvPr>
+          <p:cNvSpPr>
+            <a:spLocks noGrp="1"/>
+          </p:cNvSpPr>
+          <p:nvPr>
+            <p:ph type="title"/>
+          </p:nvPr>
+        </p:nvSpPr>
         <p:spPr>
           <a:xfrm>
-            <a:off x="20" y="10"/>
-            <a:ext cx="12191980" cy="6857990"/>
+            <a:off x="838200" y="2766218"/>
+            <a:ext cx="10515600" cy="1325563"/>
           </a:xfrm>
-          <a:prstGeom prst="rect">
-            <a:avLst/>
-          </a:prstGeom>
         </p:spPr>
-      </p:pic>
+        <p:txBody>
+          <a:bodyPr/>
+          <a:lstStyle/>
+          <a:p>
+            <a:pPr algn="ctr"/>
+            <a:r>
+              <a:rPr lang="en-US" dirty="0"/>
+              <a:t>Percent of State Population Infected with COVID-19</a:t>
+            </a:r>
+          </a:p>
+        </p:txBody>
+      </p:sp>
     </p:spTree>
     <p:extLst>
       <p:ext uri="{BB962C8B-B14F-4D97-AF65-F5344CB8AC3E}">
-        <p14:creationId xmlns:p14="http://schemas.microsoft.com/office/powerpoint/2010/main" val="3702363702"/>
+        <p14:creationId xmlns:p14="http://schemas.microsoft.com/office/powerpoint/2010/main" val="411004835"/>
       </p:ext>
     </p:extLst>
   </p:cSld>

</xml_diff>